<commit_message>
menambah kegiatan tor dan rab
menambah kegiatan tor dan rab
</commit_message>
<xml_diff>
--- a/APLIKASI PPK/kegiatan aplikasi PPK.pptx
+++ b/APLIKASI PPK/kegiatan aplikasi PPK.pptx
@@ -104,6 +104,11 @@
       </a:defRPr>
     </a:lvl9pPr>
   </p:defaultTextStyle>
+  <p:extLst>
+    <p:ext uri="{EFAFB233-063F-42B5-8137-9DF3F51BA10A}">
+      <p15:sldGuideLst xmlns:p15="http://schemas.microsoft.com/office/powerpoint/2012/main"/>
+    </p:ext>
+  </p:extLst>
 </p:presentation>
 </file>
 
@@ -3766,8 +3771,8 @@
         </p:nvGrpSpPr>
         <p:grpSpPr>
           <a:xfrm>
-            <a:off x="2838124" y="1865627"/>
-            <a:ext cx="4768535" cy="1616930"/>
+            <a:off x="2838124" y="1865626"/>
+            <a:ext cx="4768535" cy="1977221"/>
             <a:chOff x="720000" y="4898547"/>
             <a:chExt cx="5796216" cy="1425288"/>
           </a:xfrm>
@@ -3958,7 +3963,7 @@
         <p:spPr>
           <a:xfrm>
             <a:off x="3066179" y="2457853"/>
-            <a:ext cx="4339308" cy="1200329"/>
+            <a:ext cx="4339308" cy="1384995"/>
           </a:xfrm>
           <a:prstGeom prst="rect">
             <a:avLst/>
@@ -4244,6 +4249,30 @@
                 <a:cs typeface="Arial" pitchFamily="34" charset="0"/>
               </a:rPr>
               <a:t>)</a:t>
+            </a:r>
+          </a:p>
+          <a:p>
+            <a:pPr marL="171459" indent="-171459">
+              <a:buFont typeface="Wingdings" pitchFamily="2" charset="2"/>
+              <a:buChar char="l"/>
+            </a:pPr>
+            <a:r>
+              <a:rPr lang="en-US" altLang="ko-KR" sz="1200" dirty="0" err="1">
+                <a:solidFill>
+                  <a:srgbClr val="262626"/>
+                </a:solidFill>
+                <a:cs typeface="Arial" pitchFamily="34" charset="0"/>
+              </a:rPr>
+              <a:t>Membuat</a:t>
+            </a:r>
+            <a:r>
+              <a:rPr lang="en-US" altLang="ko-KR" sz="1200" dirty="0">
+                <a:solidFill>
+                  <a:srgbClr val="262626"/>
+                </a:solidFill>
+                <a:cs typeface="Arial" pitchFamily="34" charset="0"/>
+              </a:rPr>
+              <a:t> TOR dan RAB</a:t>
             </a:r>
           </a:p>
           <a:p>

</xml_diff>